<commit_message>
fix URL to change google password (english)
</commit_message>
<xml_diff>
--- a/events/2021-09-15/slides/02-security-en.pptx
+++ b/events/2021-09-15/slides/02-security-en.pptx
@@ -253,7 +253,7 @@
             <a:fld id="{35305EB0-020F-4995-961E-A35B2BB78D2B}" type="datetimeFigureOut">
               <a:rPr kumimoji="1" lang="ja-JP" altLang="en-US" smtClean="0"/>
               <a:pPr/>
-              <a:t>2021/9/15</a:t>
+              <a:t>2021/9/18</a:t>
             </a:fld>
             <a:endParaRPr kumimoji="1" lang="ja-JP" altLang="en-US"/>
           </a:p>
@@ -57168,7 +57168,7 @@
             <p:ph idx="1"/>
             <p:extLst>
               <p:ext uri="{D42A27DB-BD31-4B8C-83A1-F6EECF244321}">
-                <p14:modId xmlns:p14="http://schemas.microsoft.com/office/powerpoint/2010/main" val="779427092"/>
+                <p14:modId xmlns:p14="http://schemas.microsoft.com/office/powerpoint/2010/main" val="1402626138"/>
               </p:ext>
             </p:extLst>
           </p:nvPr>
@@ -57398,7 +57398,7 @@
                         <a:rPr kumimoji="1" lang="en-US" altLang="ja-JP" dirty="0">
                           <a:hlinkClick r:id="rId5"/>
                         </a:rPr>
-                        <a:t>https://idm.ecc.u-tokyo.ac.jp/webmtn/sso-saml</a:t>
+                        <a:t>https://idm.ecc.u-tokyo.ac.jp/webmtn/</a:t>
                       </a:r>
                       <a:endParaRPr kumimoji="1" lang="en-US" altLang="ja-JP" dirty="0"/>
                     </a:p>

</xml_diff>